<commit_message>
refactor: correção de codigo na geração das colunas ano_mes em todas as tabelas para ganho de performance
</commit_message>
<xml_diff>
--- a/dashboards/Mockup dashboard (em construção).pptx
+++ b/dashboards/Mockup dashboard (em construção).pptx
@@ -3515,7 +3515,7 @@
         <p:spPr>
           <a:xfrm>
             <a:off x="-1170" y="-45343"/>
-            <a:ext cx="12213078" cy="540522"/>
+            <a:ext cx="12233684" cy="853130"/>
           </a:xfrm>
           <a:custGeom>
             <a:avLst/>
@@ -3772,6 +3772,42 @@
               <a:gd name="connsiteY7" fmla="*/ 245785 h 540522"/>
               <a:gd name="connsiteX8" fmla="*/ 1172 w 12213078"/>
               <a:gd name="connsiteY8" fmla="*/ 245786 h 540522"/>
+              <a:gd name="connsiteX0" fmla="*/ 1172 w 12198313"/>
+              <a:gd name="connsiteY0" fmla="*/ 245786 h 540522"/>
+              <a:gd name="connsiteX1" fmla="*/ 246958 w 12198313"/>
+              <a:gd name="connsiteY1" fmla="*/ 0 h 540522"/>
+              <a:gd name="connsiteX2" fmla="*/ 11947387 w 12198313"/>
+              <a:gd name="connsiteY2" fmla="*/ 0 h 540522"/>
+              <a:gd name="connsiteX3" fmla="*/ 12193173 w 12198313"/>
+              <a:gd name="connsiteY3" fmla="*/ 245786 h 540522"/>
+              <a:gd name="connsiteX4" fmla="*/ 12193172 w 12198313"/>
+              <a:gd name="connsiteY4" fmla="*/ 245786 h 540522"/>
+              <a:gd name="connsiteX5" fmla="*/ 12178366 w 12198313"/>
+              <a:gd name="connsiteY5" fmla="*/ 526990 h 540522"/>
+              <a:gd name="connsiteX6" fmla="*/ 4223 w 12198313"/>
+              <a:gd name="connsiteY6" fmla="*/ 539413 h 540522"/>
+              <a:gd name="connsiteX7" fmla="*/ 1172 w 12198313"/>
+              <a:gd name="connsiteY7" fmla="*/ 245785 h 540522"/>
+              <a:gd name="connsiteX8" fmla="*/ 1172 w 12198313"/>
+              <a:gd name="connsiteY8" fmla="*/ 245786 h 540522"/>
+              <a:gd name="connsiteX0" fmla="*/ 1172 w 12233684"/>
+              <a:gd name="connsiteY0" fmla="*/ 245786 h 551725"/>
+              <a:gd name="connsiteX1" fmla="*/ 246958 w 12233684"/>
+              <a:gd name="connsiteY1" fmla="*/ 0 h 551725"/>
+              <a:gd name="connsiteX2" fmla="*/ 11947387 w 12233684"/>
+              <a:gd name="connsiteY2" fmla="*/ 0 h 551725"/>
+              <a:gd name="connsiteX3" fmla="*/ 12193173 w 12233684"/>
+              <a:gd name="connsiteY3" fmla="*/ 245786 h 551725"/>
+              <a:gd name="connsiteX4" fmla="*/ 12193172 w 12233684"/>
+              <a:gd name="connsiteY4" fmla="*/ 245786 h 551725"/>
+              <a:gd name="connsiteX5" fmla="*/ 12224086 w 12233684"/>
+              <a:gd name="connsiteY5" fmla="*/ 551630 h 551725"/>
+              <a:gd name="connsiteX6" fmla="*/ 4223 w 12233684"/>
+              <a:gd name="connsiteY6" fmla="*/ 539413 h 551725"/>
+              <a:gd name="connsiteX7" fmla="*/ 1172 w 12233684"/>
+              <a:gd name="connsiteY7" fmla="*/ 245785 h 551725"/>
+              <a:gd name="connsiteX8" fmla="*/ 1172 w 12233684"/>
+              <a:gd name="connsiteY8" fmla="*/ 245786 h 551725"/>
             </a:gdLst>
             <a:ahLst/>
             <a:cxnLst>
@@ -3805,7 +3841,7 @@
             </a:cxnLst>
             <a:rect l="l" t="t" r="r" b="b"/>
             <a:pathLst>
-              <a:path w="12213078" h="540522">
+              <a:path w="12233684" h="551725">
                 <a:moveTo>
                   <a:pt x="1172" y="245786"/>
                 </a:moveTo>
@@ -3827,8 +3863,8 @@
                 </a:lnTo>
                 <a:cubicBezTo>
                   <a:pt x="12193172" y="381530"/>
-                  <a:pt x="12233149" y="496334"/>
-                  <a:pt x="12199798" y="491571"/>
+                  <a:pt x="12257437" y="556393"/>
+                  <a:pt x="12224086" y="551630"/>
                 </a:cubicBezTo>
                 <a:lnTo>
                   <a:pt x="4223" y="539413"/>
@@ -3892,8 +3928,8 @@
         </p:nvSpPr>
         <p:spPr>
           <a:xfrm>
-            <a:off x="1062406" y="595695"/>
-            <a:ext cx="2377469" cy="1233105"/>
+            <a:off x="1062406" y="872533"/>
+            <a:ext cx="2377469" cy="1037820"/>
           </a:xfrm>
           <a:prstGeom prst="roundRect">
             <a:avLst>
@@ -3953,8 +3989,8 @@
         </p:nvSpPr>
         <p:spPr>
           <a:xfrm>
-            <a:off x="3835067" y="595695"/>
-            <a:ext cx="2377469" cy="1233105"/>
+            <a:off x="3838574" y="878241"/>
+            <a:ext cx="2377469" cy="1037820"/>
           </a:xfrm>
           <a:prstGeom prst="roundRect">
             <a:avLst>
@@ -4014,8 +4050,8 @@
         </p:nvSpPr>
         <p:spPr>
           <a:xfrm>
-            <a:off x="6607728" y="603871"/>
-            <a:ext cx="2377469" cy="1224930"/>
+            <a:off x="6611235" y="886416"/>
+            <a:ext cx="2377469" cy="1030940"/>
           </a:xfrm>
           <a:prstGeom prst="roundRect">
             <a:avLst>
@@ -4075,8 +4111,8 @@
         </p:nvSpPr>
         <p:spPr>
           <a:xfrm>
-            <a:off x="9380389" y="603871"/>
-            <a:ext cx="2377469" cy="1224930"/>
+            <a:off x="9383896" y="886416"/>
+            <a:ext cx="2377469" cy="1030940"/>
           </a:xfrm>
           <a:prstGeom prst="roundRect">
             <a:avLst>
@@ -4402,8 +4438,8 @@
         </p:blipFill>
         <p:spPr>
           <a:xfrm>
-            <a:off x="-151399" y="-496475"/>
-            <a:ext cx="1946544" cy="1496684"/>
+            <a:off x="-151400" y="-496476"/>
+            <a:ext cx="2342499" cy="1801131"/>
           </a:xfrm>
           <a:prstGeom prst="rect">
             <a:avLst/>
@@ -4424,7 +4460,7 @@
         </p:nvSpPr>
         <p:spPr>
           <a:xfrm>
-            <a:off x="1393089" y="68136"/>
+            <a:off x="1699976" y="227802"/>
             <a:ext cx="2532868" cy="309954"/>
           </a:xfrm>
           <a:prstGeom prst="roundRect">
@@ -4495,7 +4531,7 @@
         </p:blipFill>
         <p:spPr>
           <a:xfrm>
-            <a:off x="2966410" y="672349"/>
+            <a:off x="2966410" y="949186"/>
             <a:ext cx="356262" cy="356262"/>
           </a:xfrm>
           <a:prstGeom prst="rect">
@@ -4517,7 +4553,7 @@
         </p:nvSpPr>
         <p:spPr>
           <a:xfrm>
-            <a:off x="2927746" y="628280"/>
+            <a:off x="2927746" y="905117"/>
             <a:ext cx="433589" cy="466012"/>
           </a:xfrm>
           <a:prstGeom prst="roundRect">
@@ -4573,7 +4609,7 @@
         </p:nvSpPr>
         <p:spPr>
           <a:xfrm>
-            <a:off x="5691905" y="626568"/>
+            <a:off x="5695412" y="909113"/>
             <a:ext cx="450374" cy="466489"/>
           </a:xfrm>
           <a:prstGeom prst="roundRect">
@@ -4629,7 +4665,7 @@
         </p:nvSpPr>
         <p:spPr>
           <a:xfrm>
-            <a:off x="8457048" y="634743"/>
+            <a:off x="8460555" y="917288"/>
             <a:ext cx="450374" cy="466489"/>
           </a:xfrm>
           <a:prstGeom prst="roundRect">
@@ -4685,7 +4721,7 @@
         </p:nvSpPr>
         <p:spPr>
           <a:xfrm>
-            <a:off x="11247143" y="634744"/>
+            <a:off x="11250650" y="917289"/>
             <a:ext cx="447922" cy="458314"/>
           </a:xfrm>
           <a:prstGeom prst="roundRect">
@@ -4755,7 +4791,7 @@
         </p:blipFill>
         <p:spPr>
           <a:xfrm>
-            <a:off x="5738615" y="665166"/>
+            <a:off x="5742122" y="947711"/>
             <a:ext cx="356953" cy="356953"/>
           </a:xfrm>
           <a:prstGeom prst="rect">
@@ -4791,7 +4827,7 @@
         </p:blipFill>
         <p:spPr>
           <a:xfrm>
-            <a:off x="11290569" y="669341"/>
+            <a:off x="11294076" y="951886"/>
             <a:ext cx="359270" cy="359270"/>
           </a:xfrm>
           <a:prstGeom prst="rect">
@@ -4827,7 +4863,7 @@
         </p:blipFill>
         <p:spPr>
           <a:xfrm>
-            <a:off x="8521861" y="694655"/>
+            <a:off x="8525368" y="977200"/>
             <a:ext cx="328001" cy="328001"/>
           </a:xfrm>
           <a:prstGeom prst="rect">
@@ -5220,10 +5256,10 @@
       </p:sp>
       <p:sp>
         <p:nvSpPr>
-          <p:cNvPr id="43" name="Retângulo: Cantos Arredondados 42">
-            <a:extLst>
-              <a:ext uri="{FF2B5EF4-FFF2-40B4-BE49-F238E27FC236}">
-                <a16:creationId xmlns:a16="http://schemas.microsoft.com/office/drawing/2014/main" id="{657EB1DC-6A08-BB42-DCFA-6F15BB41DE40}"/>
+          <p:cNvPr id="6" name="Retângulo: Cantos Arredondados 5">
+            <a:extLst>
+              <a:ext uri="{FF2B5EF4-FFF2-40B4-BE49-F238E27FC236}">
+                <a16:creationId xmlns:a16="http://schemas.microsoft.com/office/drawing/2014/main" id="{FC26449B-EDB2-FD78-A80D-52380FF78B60}"/>
               </a:ext>
             </a:extLst>
           </p:cNvPr>
@@ -5232,8 +5268,1052 @@
         </p:nvSpPr>
         <p:spPr>
           <a:xfrm>
+            <a:off x="1023457" y="898501"/>
+            <a:ext cx="2377469" cy="1078503"/>
+          </a:xfrm>
+          <a:prstGeom prst="roundRect">
+            <a:avLst>
+              <a:gd name="adj" fmla="val 8257"/>
+            </a:avLst>
+          </a:prstGeom>
+          <a:solidFill>
+            <a:schemeClr val="bg1"/>
+          </a:solidFill>
+          <a:ln>
+            <a:noFill/>
+          </a:ln>
+          <a:effectLst>
+            <a:outerShdw blurRad="101600" dist="38100" dir="5400000" algn="t" rotWithShape="0">
+              <a:prstClr val="black">
+                <a:alpha val="20000"/>
+              </a:prstClr>
+            </a:outerShdw>
+          </a:effectLst>
+        </p:spPr>
+        <p:style>
+          <a:lnRef idx="2">
+            <a:schemeClr val="accent1">
+              <a:shade val="15000"/>
+            </a:schemeClr>
+          </a:lnRef>
+          <a:fillRef idx="1">
+            <a:schemeClr val="accent1"/>
+          </a:fillRef>
+          <a:effectRef idx="0">
+            <a:schemeClr val="accent1"/>
+          </a:effectRef>
+          <a:fontRef idx="minor">
+            <a:schemeClr val="lt1"/>
+          </a:fontRef>
+        </p:style>
+        <p:txBody>
+          <a:bodyPr rtlCol="0" anchor="ctr"/>
+          <a:lstStyle/>
+          <a:p>
+            <a:pPr algn="ctr"/>
+            <a:endParaRPr lang="pt-BR"/>
+          </a:p>
+        </p:txBody>
+      </p:sp>
+      <p:sp>
+        <p:nvSpPr>
+          <p:cNvPr id="7" name="Retângulo: Cantos Arredondados 6">
+            <a:extLst>
+              <a:ext uri="{FF2B5EF4-FFF2-40B4-BE49-F238E27FC236}">
+                <a16:creationId xmlns:a16="http://schemas.microsoft.com/office/drawing/2014/main" id="{C1D1ACFA-3461-5FAE-3782-4DD171E7EFDF}"/>
+              </a:ext>
+            </a:extLst>
+          </p:cNvPr>
+          <p:cNvSpPr/>
+          <p:nvPr/>
+        </p:nvSpPr>
+        <p:spPr>
+          <a:xfrm>
+            <a:off x="3842379" y="894666"/>
+            <a:ext cx="2377469" cy="1078503"/>
+          </a:xfrm>
+          <a:prstGeom prst="roundRect">
+            <a:avLst>
+              <a:gd name="adj" fmla="val 7416"/>
+            </a:avLst>
+          </a:prstGeom>
+          <a:solidFill>
+            <a:schemeClr val="bg1"/>
+          </a:solidFill>
+          <a:ln>
+            <a:noFill/>
+          </a:ln>
+          <a:effectLst>
+            <a:outerShdw blurRad="101600" dist="38100" dir="5400000" algn="t" rotWithShape="0">
+              <a:prstClr val="black">
+                <a:alpha val="20000"/>
+              </a:prstClr>
+            </a:outerShdw>
+          </a:effectLst>
+        </p:spPr>
+        <p:style>
+          <a:lnRef idx="2">
+            <a:schemeClr val="accent1">
+              <a:shade val="15000"/>
+            </a:schemeClr>
+          </a:lnRef>
+          <a:fillRef idx="1">
+            <a:schemeClr val="accent1"/>
+          </a:fillRef>
+          <a:effectRef idx="0">
+            <a:schemeClr val="accent1"/>
+          </a:effectRef>
+          <a:fontRef idx="minor">
+            <a:schemeClr val="lt1"/>
+          </a:fontRef>
+        </p:style>
+        <p:txBody>
+          <a:bodyPr rtlCol="0" anchor="ctr"/>
+          <a:lstStyle/>
+          <a:p>
+            <a:pPr algn="ctr"/>
+            <a:endParaRPr lang="pt-BR"/>
+          </a:p>
+        </p:txBody>
+      </p:sp>
+      <p:sp>
+        <p:nvSpPr>
+          <p:cNvPr id="8" name="Retângulo: Cantos Arredondados 7">
+            <a:extLst>
+              <a:ext uri="{FF2B5EF4-FFF2-40B4-BE49-F238E27FC236}">
+                <a16:creationId xmlns:a16="http://schemas.microsoft.com/office/drawing/2014/main" id="{65F19F60-83F0-EC32-4520-3604AE1ADE84}"/>
+              </a:ext>
+            </a:extLst>
+          </p:cNvPr>
+          <p:cNvSpPr/>
+          <p:nvPr/>
+        </p:nvSpPr>
+        <p:spPr>
+          <a:xfrm>
+            <a:off x="6661301" y="894667"/>
+            <a:ext cx="2377469" cy="1078502"/>
+          </a:xfrm>
+          <a:prstGeom prst="roundRect">
+            <a:avLst>
+              <a:gd name="adj" fmla="val 7416"/>
+            </a:avLst>
+          </a:prstGeom>
+          <a:solidFill>
+            <a:schemeClr val="bg1"/>
+          </a:solidFill>
+          <a:ln>
+            <a:noFill/>
+          </a:ln>
+          <a:effectLst>
+            <a:outerShdw blurRad="101600" dist="38100" dir="5400000" algn="t" rotWithShape="0">
+              <a:prstClr val="black">
+                <a:alpha val="20000"/>
+              </a:prstClr>
+            </a:outerShdw>
+          </a:effectLst>
+        </p:spPr>
+        <p:style>
+          <a:lnRef idx="2">
+            <a:schemeClr val="accent1">
+              <a:shade val="15000"/>
+            </a:schemeClr>
+          </a:lnRef>
+          <a:fillRef idx="1">
+            <a:schemeClr val="accent1"/>
+          </a:fillRef>
+          <a:effectRef idx="0">
+            <a:schemeClr val="accent1"/>
+          </a:effectRef>
+          <a:fontRef idx="minor">
+            <a:schemeClr val="lt1"/>
+          </a:fontRef>
+        </p:style>
+        <p:txBody>
+          <a:bodyPr rtlCol="0" anchor="ctr"/>
+          <a:lstStyle/>
+          <a:p>
+            <a:pPr algn="ctr"/>
+            <a:endParaRPr lang="pt-BR"/>
+          </a:p>
+        </p:txBody>
+      </p:sp>
+      <p:sp>
+        <p:nvSpPr>
+          <p:cNvPr id="9" name="Retângulo: Cantos Arredondados 8">
+            <a:extLst>
+              <a:ext uri="{FF2B5EF4-FFF2-40B4-BE49-F238E27FC236}">
+                <a16:creationId xmlns:a16="http://schemas.microsoft.com/office/drawing/2014/main" id="{6A632AA5-8ABB-DC7E-9099-17ABD1D11638}"/>
+              </a:ext>
+            </a:extLst>
+          </p:cNvPr>
+          <p:cNvSpPr/>
+          <p:nvPr/>
+        </p:nvSpPr>
+        <p:spPr>
+          <a:xfrm>
+            <a:off x="9480223" y="894667"/>
+            <a:ext cx="2377469" cy="1078502"/>
+          </a:xfrm>
+          <a:prstGeom prst="roundRect">
+            <a:avLst>
+              <a:gd name="adj" fmla="val 7416"/>
+            </a:avLst>
+          </a:prstGeom>
+          <a:solidFill>
+            <a:schemeClr val="bg1"/>
+          </a:solidFill>
+          <a:ln>
+            <a:noFill/>
+          </a:ln>
+          <a:effectLst>
+            <a:outerShdw blurRad="101600" dist="38100" dir="5400000" algn="t" rotWithShape="0">
+              <a:prstClr val="black">
+                <a:alpha val="20000"/>
+              </a:prstClr>
+            </a:outerShdw>
+          </a:effectLst>
+        </p:spPr>
+        <p:style>
+          <a:lnRef idx="2">
+            <a:schemeClr val="accent1">
+              <a:shade val="15000"/>
+            </a:schemeClr>
+          </a:lnRef>
+          <a:fillRef idx="1">
+            <a:schemeClr val="accent1"/>
+          </a:fillRef>
+          <a:effectRef idx="0">
+            <a:schemeClr val="accent1"/>
+          </a:effectRef>
+          <a:fontRef idx="minor">
+            <a:schemeClr val="lt1"/>
+          </a:fontRef>
+        </p:style>
+        <p:txBody>
+          <a:bodyPr rtlCol="0" anchor="ctr"/>
+          <a:lstStyle/>
+          <a:p>
+            <a:pPr algn="ctr"/>
+            <a:endParaRPr lang="pt-BR"/>
+          </a:p>
+        </p:txBody>
+      </p:sp>
+      <p:sp>
+        <p:nvSpPr>
+          <p:cNvPr id="10" name="Retângulo: Cantos Arredondados 9">
+            <a:extLst>
+              <a:ext uri="{FF2B5EF4-FFF2-40B4-BE49-F238E27FC236}">
+                <a16:creationId xmlns:a16="http://schemas.microsoft.com/office/drawing/2014/main" id="{150E8CFD-F5FC-3CEB-1CE3-7FEEBA137545}"/>
+              </a:ext>
+            </a:extLst>
+          </p:cNvPr>
+          <p:cNvSpPr/>
+          <p:nvPr/>
+        </p:nvSpPr>
+        <p:spPr>
+          <a:xfrm>
+            <a:off x="1023457" y="2166731"/>
+            <a:ext cx="8421442" cy="4501542"/>
+          </a:xfrm>
+          <a:prstGeom prst="roundRect">
+            <a:avLst>
+              <a:gd name="adj" fmla="val 5297"/>
+            </a:avLst>
+          </a:prstGeom>
+          <a:solidFill>
+            <a:schemeClr val="bg1"/>
+          </a:solidFill>
+          <a:ln>
+            <a:noFill/>
+          </a:ln>
+          <a:effectLst>
+            <a:outerShdw blurRad="101600" dist="38100" dir="5400000" algn="t" rotWithShape="0">
+              <a:prstClr val="black">
+                <a:alpha val="20000"/>
+              </a:prstClr>
+            </a:outerShdw>
+          </a:effectLst>
+        </p:spPr>
+        <p:style>
+          <a:lnRef idx="2">
+            <a:schemeClr val="accent1">
+              <a:shade val="15000"/>
+            </a:schemeClr>
+          </a:lnRef>
+          <a:fillRef idx="1">
+            <a:schemeClr val="accent1"/>
+          </a:fillRef>
+          <a:effectRef idx="0">
+            <a:schemeClr val="accent1"/>
+          </a:effectRef>
+          <a:fontRef idx="minor">
+            <a:schemeClr val="lt1"/>
+          </a:fontRef>
+        </p:style>
+        <p:txBody>
+          <a:bodyPr rtlCol="0" anchor="ctr"/>
+          <a:lstStyle/>
+          <a:p>
+            <a:pPr algn="ctr"/>
+            <a:endParaRPr lang="pt-BR"/>
+          </a:p>
+        </p:txBody>
+      </p:sp>
+      <p:sp>
+        <p:nvSpPr>
+          <p:cNvPr id="34" name="Rectangle 1">
+            <a:extLst>
+              <a:ext uri="{FF2B5EF4-FFF2-40B4-BE49-F238E27FC236}">
+                <a16:creationId xmlns:a16="http://schemas.microsoft.com/office/drawing/2014/main" id="{C7E92271-A996-51B7-F0A8-340C6196C620}"/>
+              </a:ext>
+            </a:extLst>
+          </p:cNvPr>
+          <p:cNvSpPr>
+            <a:spLocks noChangeArrowheads="1"/>
+          </p:cNvSpPr>
+          <p:nvPr/>
+        </p:nvSpPr>
+        <p:spPr bwMode="auto">
+          <a:xfrm>
+            <a:off x="0" y="0"/>
+            <a:ext cx="12192000" cy="0"/>
+          </a:xfrm>
+          <a:prstGeom prst="rect">
+            <a:avLst/>
+          </a:prstGeom>
+          <a:noFill/>
+          <a:ln>
+            <a:noFill/>
+          </a:ln>
+          <a:effectLst/>
+          <a:extLst>
+            <a:ext uri="{909E8E84-426E-40DD-AFC4-6F175D3DCCD1}">
+              <a14:hiddenFill xmlns:a14="http://schemas.microsoft.com/office/drawing/2010/main">
+                <a:solidFill>
+                  <a:schemeClr val="accent1"/>
+                </a:solidFill>
+              </a14:hiddenFill>
+            </a:ext>
+            <a:ext uri="{91240B29-F687-4F45-9708-019B960494DF}">
+              <a14:hiddenLine xmlns:a14="http://schemas.microsoft.com/office/drawing/2010/main" w="9525">
+                <a:solidFill>
+                  <a:schemeClr val="tx1"/>
+                </a:solidFill>
+                <a:miter lim="800000"/>
+                <a:headEnd/>
+                <a:tailEnd/>
+              </a14:hiddenLine>
+            </a:ext>
+            <a:ext uri="{AF507438-7753-43E0-B8FC-AC1667EBCBE1}">
+              <a14:hiddenEffects xmlns:a14="http://schemas.microsoft.com/office/drawing/2010/main">
+                <a:effectLst>
+                  <a:outerShdw dist="35921" dir="2700000" algn="ctr" rotWithShape="0">
+                    <a:schemeClr val="bg2"/>
+                  </a:outerShdw>
+                </a:effectLst>
+              </a14:hiddenEffects>
+            </a:ext>
+          </a:extLst>
+        </p:spPr>
+        <p:txBody>
+          <a:bodyPr vert="horz" wrap="none" lIns="91440" tIns="45720" rIns="91440" bIns="45720" numCol="1" anchor="ctr" anchorCtr="0" compatLnSpc="1">
+            <a:prstTxWarp prst="textNoShape">
+              <a:avLst/>
+            </a:prstTxWarp>
+            <a:spAutoFit/>
+          </a:bodyPr>
+          <a:lstStyle/>
+          <a:p>
+            <a:endParaRPr lang="pt-BR"/>
+          </a:p>
+        </p:txBody>
+      </p:sp>
+      <p:sp>
+        <p:nvSpPr>
+          <p:cNvPr id="56" name="Retângulo: Cantos Arredondados 55">
+            <a:extLst>
+              <a:ext uri="{FF2B5EF4-FFF2-40B4-BE49-F238E27FC236}">
+                <a16:creationId xmlns:a16="http://schemas.microsoft.com/office/drawing/2014/main" id="{D4F2FB47-E006-A114-B89C-26A04457A230}"/>
+              </a:ext>
+            </a:extLst>
+          </p:cNvPr>
+          <p:cNvSpPr/>
+          <p:nvPr/>
+        </p:nvSpPr>
+        <p:spPr>
+          <a:xfrm>
+            <a:off x="2872933" y="936982"/>
+            <a:ext cx="433589" cy="466012"/>
+          </a:xfrm>
+          <a:prstGeom prst="roundRect">
+            <a:avLst>
+              <a:gd name="adj" fmla="val 35127"/>
+            </a:avLst>
+          </a:prstGeom>
+          <a:solidFill>
+            <a:srgbClr val="2F3A5F">
+              <a:alpha val="18000"/>
+            </a:srgbClr>
+          </a:solidFill>
+          <a:ln>
+            <a:noFill/>
+          </a:ln>
+        </p:spPr>
+        <p:style>
+          <a:lnRef idx="2">
+            <a:schemeClr val="accent1">
+              <a:shade val="15000"/>
+            </a:schemeClr>
+          </a:lnRef>
+          <a:fillRef idx="1">
+            <a:schemeClr val="accent1"/>
+          </a:fillRef>
+          <a:effectRef idx="0">
+            <a:schemeClr val="accent1"/>
+          </a:effectRef>
+          <a:fontRef idx="minor">
+            <a:schemeClr val="lt1"/>
+          </a:fontRef>
+        </p:style>
+        <p:txBody>
+          <a:bodyPr rtlCol="0" anchor="ctr"/>
+          <a:lstStyle/>
+          <a:p>
+            <a:pPr algn="ctr"/>
+            <a:endParaRPr lang="pt-BR" dirty="0"/>
+          </a:p>
+        </p:txBody>
+      </p:sp>
+      <p:sp>
+        <p:nvSpPr>
+          <p:cNvPr id="57" name="Retângulo: Cantos Arredondados 56">
+            <a:extLst>
+              <a:ext uri="{FF2B5EF4-FFF2-40B4-BE49-F238E27FC236}">
+                <a16:creationId xmlns:a16="http://schemas.microsoft.com/office/drawing/2014/main" id="{D9909437-8353-1D03-C311-8E09F289071E}"/>
+              </a:ext>
+            </a:extLst>
+          </p:cNvPr>
+          <p:cNvSpPr/>
+          <p:nvPr/>
+        </p:nvSpPr>
+        <p:spPr>
+          <a:xfrm>
+            <a:off x="5681557" y="930022"/>
+            <a:ext cx="450374" cy="466489"/>
+          </a:xfrm>
+          <a:prstGeom prst="roundRect">
+            <a:avLst>
+              <a:gd name="adj" fmla="val 35127"/>
+            </a:avLst>
+          </a:prstGeom>
+          <a:solidFill>
+            <a:srgbClr val="2F3A5F">
+              <a:alpha val="17647"/>
+            </a:srgbClr>
+          </a:solidFill>
+          <a:ln>
+            <a:noFill/>
+          </a:ln>
+        </p:spPr>
+        <p:style>
+          <a:lnRef idx="2">
+            <a:schemeClr val="accent1">
+              <a:shade val="15000"/>
+            </a:schemeClr>
+          </a:lnRef>
+          <a:fillRef idx="1">
+            <a:schemeClr val="accent1"/>
+          </a:fillRef>
+          <a:effectRef idx="0">
+            <a:schemeClr val="accent1"/>
+          </a:effectRef>
+          <a:fontRef idx="minor">
+            <a:schemeClr val="lt1"/>
+          </a:fontRef>
+        </p:style>
+        <p:txBody>
+          <a:bodyPr rtlCol="0" anchor="ctr"/>
+          <a:lstStyle/>
+          <a:p>
+            <a:pPr algn="ctr"/>
+            <a:endParaRPr lang="pt-BR"/>
+          </a:p>
+        </p:txBody>
+      </p:sp>
+      <p:sp>
+        <p:nvSpPr>
+          <p:cNvPr id="58" name="Retângulo: Cantos Arredondados 57">
+            <a:extLst>
+              <a:ext uri="{FF2B5EF4-FFF2-40B4-BE49-F238E27FC236}">
+                <a16:creationId xmlns:a16="http://schemas.microsoft.com/office/drawing/2014/main" id="{849E17AF-F204-D19B-83B7-493ED982D77C}"/>
+              </a:ext>
+            </a:extLst>
+          </p:cNvPr>
+          <p:cNvSpPr/>
+          <p:nvPr/>
+        </p:nvSpPr>
+        <p:spPr>
+          <a:xfrm>
+            <a:off x="8492961" y="930022"/>
+            <a:ext cx="450374" cy="466489"/>
+          </a:xfrm>
+          <a:prstGeom prst="roundRect">
+            <a:avLst>
+              <a:gd name="adj" fmla="val 35127"/>
+            </a:avLst>
+          </a:prstGeom>
+          <a:solidFill>
+            <a:srgbClr val="2F3A5F">
+              <a:alpha val="18000"/>
+            </a:srgbClr>
+          </a:solidFill>
+          <a:ln>
+            <a:noFill/>
+          </a:ln>
+        </p:spPr>
+        <p:style>
+          <a:lnRef idx="2">
+            <a:schemeClr val="accent1">
+              <a:shade val="15000"/>
+            </a:schemeClr>
+          </a:lnRef>
+          <a:fillRef idx="1">
+            <a:schemeClr val="accent1"/>
+          </a:fillRef>
+          <a:effectRef idx="0">
+            <a:schemeClr val="accent1"/>
+          </a:effectRef>
+          <a:fontRef idx="minor">
+            <a:schemeClr val="lt1"/>
+          </a:fontRef>
+        </p:style>
+        <p:txBody>
+          <a:bodyPr rtlCol="0" anchor="ctr"/>
+          <a:lstStyle/>
+          <a:p>
+            <a:pPr algn="ctr"/>
+            <a:endParaRPr lang="pt-BR"/>
+          </a:p>
+        </p:txBody>
+      </p:sp>
+      <p:sp>
+        <p:nvSpPr>
+          <p:cNvPr id="59" name="Retângulo: Cantos Arredondados 58">
+            <a:extLst>
+              <a:ext uri="{FF2B5EF4-FFF2-40B4-BE49-F238E27FC236}">
+                <a16:creationId xmlns:a16="http://schemas.microsoft.com/office/drawing/2014/main" id="{52FF75AF-44A2-0E85-0E41-7AB475B2B28B}"/>
+              </a:ext>
+            </a:extLst>
+          </p:cNvPr>
+          <p:cNvSpPr/>
+          <p:nvPr/>
+        </p:nvSpPr>
+        <p:spPr>
+          <a:xfrm>
+            <a:off x="11329317" y="930022"/>
+            <a:ext cx="450374" cy="466489"/>
+          </a:xfrm>
+          <a:prstGeom prst="roundRect">
+            <a:avLst>
+              <a:gd name="adj" fmla="val 35127"/>
+            </a:avLst>
+          </a:prstGeom>
+          <a:solidFill>
+            <a:srgbClr val="2F3A5F">
+              <a:alpha val="18000"/>
+            </a:srgbClr>
+          </a:solidFill>
+          <a:ln>
+            <a:noFill/>
+          </a:ln>
+        </p:spPr>
+        <p:style>
+          <a:lnRef idx="2">
+            <a:schemeClr val="accent1">
+              <a:shade val="15000"/>
+            </a:schemeClr>
+          </a:lnRef>
+          <a:fillRef idx="1">
+            <a:schemeClr val="accent1"/>
+          </a:fillRef>
+          <a:effectRef idx="0">
+            <a:schemeClr val="accent1"/>
+          </a:effectRef>
+          <a:fontRef idx="minor">
+            <a:schemeClr val="lt1"/>
+          </a:fontRef>
+        </p:style>
+        <p:txBody>
+          <a:bodyPr rtlCol="0" anchor="ctr"/>
+          <a:lstStyle/>
+          <a:p>
+            <a:pPr algn="ctr"/>
+            <a:endParaRPr lang="pt-BR"/>
+          </a:p>
+        </p:txBody>
+      </p:sp>
+      <p:pic>
+        <p:nvPicPr>
+          <p:cNvPr id="16" name="Imagem 15" descr="Logotipo, Ícone&#10;&#10;O conteúdo gerado por IA pode estar incorreto.">
+            <a:extLst>
+              <a:ext uri="{FF2B5EF4-FFF2-40B4-BE49-F238E27FC236}">
+                <a16:creationId xmlns:a16="http://schemas.microsoft.com/office/drawing/2014/main" id="{72750EFD-5EB9-84F7-327A-F804A22CDF68}"/>
+              </a:ext>
+            </a:extLst>
+          </p:cNvPr>
+          <p:cNvPicPr>
+            <a:picLocks noChangeAspect="1"/>
+          </p:cNvPicPr>
+          <p:nvPr/>
+        </p:nvPicPr>
+        <p:blipFill>
+          <a:blip r:embed="rId2">
+            <a:extLst>
+              <a:ext uri="{28A0092B-C50C-407E-A947-70E740481C1C}">
+                <a14:useLocalDpi xmlns:a14="http://schemas.microsoft.com/office/drawing/2010/main" val="0"/>
+              </a:ext>
+            </a:extLst>
+          </a:blip>
+          <a:stretch>
+            <a:fillRect/>
+          </a:stretch>
+        </p:blipFill>
+        <p:spPr>
+          <a:xfrm>
+            <a:off x="88189" y="3465029"/>
+            <a:ext cx="483326" cy="483326"/>
+          </a:xfrm>
+          <a:prstGeom prst="rect">
+            <a:avLst/>
+          </a:prstGeom>
+        </p:spPr>
+      </p:pic>
+      <p:pic>
+        <p:nvPicPr>
+          <p:cNvPr id="22" name="Imagem 21" descr="Ícone&#10;&#10;O conteúdo gerado por IA pode estar incorreto.">
+            <a:extLst>
+              <a:ext uri="{FF2B5EF4-FFF2-40B4-BE49-F238E27FC236}">
+                <a16:creationId xmlns:a16="http://schemas.microsoft.com/office/drawing/2014/main" id="{80050991-3381-8A02-8110-9D095FC4F3C1}"/>
+              </a:ext>
+            </a:extLst>
+          </p:cNvPr>
+          <p:cNvPicPr>
+            <a:picLocks noChangeAspect="1"/>
+          </p:cNvPicPr>
+          <p:nvPr/>
+        </p:nvPicPr>
+        <p:blipFill>
+          <a:blip r:embed="rId3">
+            <a:extLst>
+              <a:ext uri="{28A0092B-C50C-407E-A947-70E740481C1C}">
+                <a14:useLocalDpi xmlns:a14="http://schemas.microsoft.com/office/drawing/2010/main" val="0"/>
+              </a:ext>
+            </a:extLst>
+          </a:blip>
+          <a:stretch>
+            <a:fillRect/>
+          </a:stretch>
+        </p:blipFill>
+        <p:spPr>
+          <a:xfrm>
+            <a:off x="88189" y="4211512"/>
+            <a:ext cx="456652" cy="456652"/>
+          </a:xfrm>
+          <a:prstGeom prst="rect">
+            <a:avLst/>
+          </a:prstGeom>
+        </p:spPr>
+      </p:pic>
+      <p:pic>
+        <p:nvPicPr>
+          <p:cNvPr id="25" name="Imagem 24" descr="Uma imagem contendo Ícone&#10;&#10;O conteúdo gerado por IA pode estar incorreto.">
+            <a:extLst>
+              <a:ext uri="{FF2B5EF4-FFF2-40B4-BE49-F238E27FC236}">
+                <a16:creationId xmlns:a16="http://schemas.microsoft.com/office/drawing/2014/main" id="{09D0A347-19B1-96AE-D96A-6F3E5EBE9360}"/>
+              </a:ext>
+            </a:extLst>
+          </p:cNvPr>
+          <p:cNvPicPr>
+            <a:picLocks noChangeAspect="1"/>
+          </p:cNvPicPr>
+          <p:nvPr/>
+        </p:nvPicPr>
+        <p:blipFill>
+          <a:blip r:embed="rId4">
+            <a:extLst>
+              <a:ext uri="{28A0092B-C50C-407E-A947-70E740481C1C}">
+                <a14:useLocalDpi xmlns:a14="http://schemas.microsoft.com/office/drawing/2010/main" val="0"/>
+              </a:ext>
+            </a:extLst>
+          </a:blip>
+          <a:stretch>
+            <a:fillRect/>
+          </a:stretch>
+        </p:blipFill>
+        <p:spPr>
+          <a:xfrm flipH="1">
+            <a:off x="138151" y="1295499"/>
+            <a:ext cx="349421" cy="349421"/>
+          </a:xfrm>
+          <a:prstGeom prst="rect">
+            <a:avLst/>
+          </a:prstGeom>
+        </p:spPr>
+      </p:pic>
+      <p:pic>
+        <p:nvPicPr>
+          <p:cNvPr id="3" name="Imagem 2" descr="Ícone&#10;&#10;O conteúdo gerado por IA pode estar incorreto.">
+            <a:extLst>
+              <a:ext uri="{FF2B5EF4-FFF2-40B4-BE49-F238E27FC236}">
+                <a16:creationId xmlns:a16="http://schemas.microsoft.com/office/drawing/2014/main" id="{5DDFF6DC-D44A-A46D-56F0-9D3568F865B5}"/>
+              </a:ext>
+            </a:extLst>
+          </p:cNvPr>
+          <p:cNvPicPr>
+            <a:picLocks noChangeAspect="1"/>
+          </p:cNvPicPr>
+          <p:nvPr/>
+        </p:nvPicPr>
+        <p:blipFill>
+          <a:blip r:embed="rId5">
+            <a:extLst>
+              <a:ext uri="{28A0092B-C50C-407E-A947-70E740481C1C}">
+                <a14:useLocalDpi xmlns:a14="http://schemas.microsoft.com/office/drawing/2010/main" val="0"/>
+              </a:ext>
+            </a:extLst>
+          </a:blip>
+          <a:stretch>
+            <a:fillRect/>
+          </a:stretch>
+        </p:blipFill>
+        <p:spPr>
+          <a:xfrm>
+            <a:off x="89890" y="1911041"/>
+            <a:ext cx="450321" cy="450321"/>
+          </a:xfrm>
+          <a:prstGeom prst="rect">
+            <a:avLst/>
+          </a:prstGeom>
+        </p:spPr>
+      </p:pic>
+      <p:pic>
+        <p:nvPicPr>
+          <p:cNvPr id="15" name="Imagem 14" descr="Ícone&#10;&#10;O conteúdo gerado por IA pode estar incorreto.">
+            <a:extLst>
+              <a:ext uri="{FF2B5EF4-FFF2-40B4-BE49-F238E27FC236}">
+                <a16:creationId xmlns:a16="http://schemas.microsoft.com/office/drawing/2014/main" id="{6DD0D9C7-92A9-3243-FC0E-365F9ACCC73C}"/>
+              </a:ext>
+            </a:extLst>
+          </p:cNvPr>
+          <p:cNvPicPr>
+            <a:picLocks noChangeAspect="1"/>
+          </p:cNvPicPr>
+          <p:nvPr/>
+        </p:nvPicPr>
+        <p:blipFill>
+          <a:blip r:embed="rId6">
+            <a:extLst>
+              <a:ext uri="{28A0092B-C50C-407E-A947-70E740481C1C}">
+                <a14:useLocalDpi xmlns:a14="http://schemas.microsoft.com/office/drawing/2010/main" val="0"/>
+              </a:ext>
+            </a:extLst>
+          </a:blip>
+          <a:stretch>
+            <a:fillRect/>
+          </a:stretch>
+        </p:blipFill>
+        <p:spPr>
+          <a:xfrm>
+            <a:off x="144153" y="2743126"/>
+            <a:ext cx="355674" cy="355674"/>
+          </a:xfrm>
+          <a:prstGeom prst="rect">
+            <a:avLst/>
+          </a:prstGeom>
+        </p:spPr>
+      </p:pic>
+      <p:sp>
+        <p:nvSpPr>
+          <p:cNvPr id="17" name="Retângulo: Cantos Arredondados 16">
+            <a:extLst>
+              <a:ext uri="{FF2B5EF4-FFF2-40B4-BE49-F238E27FC236}">
+                <a16:creationId xmlns:a16="http://schemas.microsoft.com/office/drawing/2014/main" id="{7B48C9E3-6494-5DBF-B726-271748E11AEE}"/>
+              </a:ext>
+            </a:extLst>
+          </p:cNvPr>
+          <p:cNvSpPr/>
+          <p:nvPr/>
+        </p:nvSpPr>
+        <p:spPr>
+          <a:xfrm>
+            <a:off x="9710530" y="2174508"/>
+            <a:ext cx="2347367" cy="2282750"/>
+          </a:xfrm>
+          <a:prstGeom prst="roundRect">
+            <a:avLst>
+              <a:gd name="adj" fmla="val 7416"/>
+            </a:avLst>
+          </a:prstGeom>
+          <a:solidFill>
+            <a:schemeClr val="bg1"/>
+          </a:solidFill>
+          <a:ln>
+            <a:noFill/>
+          </a:ln>
+          <a:effectLst>
+            <a:outerShdw blurRad="101600" dist="38100" dir="5400000" algn="t" rotWithShape="0">
+              <a:prstClr val="black">
+                <a:alpha val="20000"/>
+              </a:prstClr>
+            </a:outerShdw>
+          </a:effectLst>
+        </p:spPr>
+        <p:style>
+          <a:lnRef idx="2">
+            <a:schemeClr val="accent1">
+              <a:shade val="15000"/>
+            </a:schemeClr>
+          </a:lnRef>
+          <a:fillRef idx="1">
+            <a:schemeClr val="accent1"/>
+          </a:fillRef>
+          <a:effectRef idx="0">
+            <a:schemeClr val="accent1"/>
+          </a:effectRef>
+          <a:fontRef idx="minor">
+            <a:schemeClr val="lt1"/>
+          </a:fontRef>
+        </p:style>
+        <p:txBody>
+          <a:bodyPr rtlCol="0" anchor="ctr"/>
+          <a:lstStyle/>
+          <a:p>
+            <a:pPr algn="ctr"/>
+            <a:endParaRPr lang="pt-BR"/>
+          </a:p>
+        </p:txBody>
+      </p:sp>
+      <p:sp>
+        <p:nvSpPr>
+          <p:cNvPr id="18" name="Retângulo: Cantos Arredondados 17">
+            <a:extLst>
+              <a:ext uri="{FF2B5EF4-FFF2-40B4-BE49-F238E27FC236}">
+                <a16:creationId xmlns:a16="http://schemas.microsoft.com/office/drawing/2014/main" id="{1320CE6E-A79C-944E-0F18-343E50B290DF}"/>
+              </a:ext>
+            </a:extLst>
+          </p:cNvPr>
+          <p:cNvSpPr/>
+          <p:nvPr/>
+        </p:nvSpPr>
+        <p:spPr>
+          <a:xfrm>
+            <a:off x="9710530" y="4668164"/>
+            <a:ext cx="2337317" cy="2000109"/>
+          </a:xfrm>
+          <a:prstGeom prst="roundRect">
+            <a:avLst>
+              <a:gd name="adj" fmla="val 7416"/>
+            </a:avLst>
+          </a:prstGeom>
+          <a:solidFill>
+            <a:schemeClr val="bg1"/>
+          </a:solidFill>
+          <a:ln>
+            <a:noFill/>
+          </a:ln>
+          <a:effectLst>
+            <a:outerShdw blurRad="101600" dist="38100" dir="5400000" algn="t" rotWithShape="0">
+              <a:prstClr val="black">
+                <a:alpha val="20000"/>
+              </a:prstClr>
+            </a:outerShdw>
+          </a:effectLst>
+        </p:spPr>
+        <p:style>
+          <a:lnRef idx="2">
+            <a:schemeClr val="accent1">
+              <a:shade val="15000"/>
+            </a:schemeClr>
+          </a:lnRef>
+          <a:fillRef idx="1">
+            <a:schemeClr val="accent1"/>
+          </a:fillRef>
+          <a:effectRef idx="0">
+            <a:schemeClr val="accent1"/>
+          </a:effectRef>
+          <a:fontRef idx="minor">
+            <a:schemeClr val="lt1"/>
+          </a:fontRef>
+        </p:style>
+        <p:txBody>
+          <a:bodyPr rtlCol="0" anchor="ctr"/>
+          <a:lstStyle/>
+          <a:p>
+            <a:pPr algn="ctr"/>
+            <a:endParaRPr lang="pt-BR"/>
+          </a:p>
+        </p:txBody>
+      </p:sp>
+      <p:pic>
+        <p:nvPicPr>
+          <p:cNvPr id="21" name="Imagem 20" descr="Ícone&#10;&#10;O conteúdo gerado por IA pode estar incorreto.">
+            <a:extLst>
+              <a:ext uri="{FF2B5EF4-FFF2-40B4-BE49-F238E27FC236}">
+                <a16:creationId xmlns:a16="http://schemas.microsoft.com/office/drawing/2014/main" id="{EC12CAE6-C32E-A834-C9AC-32A219FA521D}"/>
+              </a:ext>
+            </a:extLst>
+          </p:cNvPr>
+          <p:cNvPicPr>
+            <a:picLocks noChangeAspect="1"/>
+          </p:cNvPicPr>
+          <p:nvPr/>
+        </p:nvPicPr>
+        <p:blipFill>
+          <a:blip r:embed="rId7">
+            <a:extLst>
+              <a:ext uri="{28A0092B-C50C-407E-A947-70E740481C1C}">
+                <a14:useLocalDpi xmlns:a14="http://schemas.microsoft.com/office/drawing/2010/main" val="0"/>
+              </a:ext>
+            </a:extLst>
+          </a:blip>
+          <a:stretch>
+            <a:fillRect/>
+          </a:stretch>
+        </p:blipFill>
+        <p:spPr>
+          <a:xfrm>
+            <a:off x="2910020" y="1003659"/>
+            <a:ext cx="332657" cy="332657"/>
+          </a:xfrm>
+          <a:prstGeom prst="rect">
+            <a:avLst/>
+          </a:prstGeom>
+        </p:spPr>
+      </p:pic>
+      <p:pic>
+        <p:nvPicPr>
+          <p:cNvPr id="24" name="Imagem 23" descr="Ícone&#10;&#10;O conteúdo gerado por IA pode estar incorreto.">
+            <a:extLst>
+              <a:ext uri="{FF2B5EF4-FFF2-40B4-BE49-F238E27FC236}">
+                <a16:creationId xmlns:a16="http://schemas.microsoft.com/office/drawing/2014/main" id="{0EC35161-6032-EBC3-1CDC-7F1E5AF964A5}"/>
+              </a:ext>
+            </a:extLst>
+          </p:cNvPr>
+          <p:cNvPicPr>
+            <a:picLocks noChangeAspect="1"/>
+          </p:cNvPicPr>
+          <p:nvPr/>
+        </p:nvPicPr>
+        <p:blipFill>
+          <a:blip r:embed="rId8">
+            <a:extLst>
+              <a:ext uri="{28A0092B-C50C-407E-A947-70E740481C1C}">
+                <a14:useLocalDpi xmlns:a14="http://schemas.microsoft.com/office/drawing/2010/main" val="0"/>
+              </a:ext>
+            </a:extLst>
+          </a:blip>
+          <a:stretch>
+            <a:fillRect/>
+          </a:stretch>
+        </p:blipFill>
+        <p:spPr>
+          <a:xfrm>
+            <a:off x="8552239" y="979400"/>
+            <a:ext cx="331817" cy="331817"/>
+          </a:xfrm>
+          <a:prstGeom prst="rect">
+            <a:avLst/>
+          </a:prstGeom>
+        </p:spPr>
+      </p:pic>
+      <p:pic>
+        <p:nvPicPr>
+          <p:cNvPr id="29" name="Imagem 28" descr="Ícone&#10;&#10;O conteúdo gerado por IA pode estar incorreto.">
+            <a:extLst>
+              <a:ext uri="{FF2B5EF4-FFF2-40B4-BE49-F238E27FC236}">
+                <a16:creationId xmlns:a16="http://schemas.microsoft.com/office/drawing/2014/main" id="{6EF39C74-10D2-438D-6758-7FC5583D575B}"/>
+              </a:ext>
+            </a:extLst>
+          </p:cNvPr>
+          <p:cNvPicPr>
+            <a:picLocks noChangeAspect="1"/>
+          </p:cNvPicPr>
+          <p:nvPr/>
+        </p:nvPicPr>
+        <p:blipFill>
+          <a:blip r:embed="rId9">
+            <a:extLst>
+              <a:ext uri="{28A0092B-C50C-407E-A947-70E740481C1C}">
+                <a14:useLocalDpi xmlns:a14="http://schemas.microsoft.com/office/drawing/2010/main" val="0"/>
+              </a:ext>
+            </a:extLst>
+          </a:blip>
+          <a:stretch>
+            <a:fillRect/>
+          </a:stretch>
+        </p:blipFill>
+        <p:spPr>
+          <a:xfrm>
+            <a:off x="11383752" y="974437"/>
+            <a:ext cx="341503" cy="341503"/>
+          </a:xfrm>
+          <a:prstGeom prst="rect">
+            <a:avLst/>
+          </a:prstGeom>
+        </p:spPr>
+      </p:pic>
+      <p:pic>
+        <p:nvPicPr>
+          <p:cNvPr id="31" name="Imagem 30" descr="Ícone&#10;&#10;O conteúdo gerado por IA pode estar incorreto.">
+            <a:extLst>
+              <a:ext uri="{FF2B5EF4-FFF2-40B4-BE49-F238E27FC236}">
+                <a16:creationId xmlns:a16="http://schemas.microsoft.com/office/drawing/2014/main" id="{D8DFE3BC-925E-2547-8113-3CEB4424401D}"/>
+              </a:ext>
+            </a:extLst>
+          </p:cNvPr>
+          <p:cNvPicPr>
+            <a:picLocks noChangeAspect="1"/>
+          </p:cNvPicPr>
+          <p:nvPr/>
+        </p:nvPicPr>
+        <p:blipFill>
+          <a:blip r:embed="rId10">
+            <a:extLst>
+              <a:ext uri="{28A0092B-C50C-407E-A947-70E740481C1C}">
+                <a14:useLocalDpi xmlns:a14="http://schemas.microsoft.com/office/drawing/2010/main" val="0"/>
+              </a:ext>
+            </a:extLst>
+          </a:blip>
+          <a:stretch>
+            <a:fillRect/>
+          </a:stretch>
+        </p:blipFill>
+        <p:spPr>
+          <a:xfrm>
+            <a:off x="5735340" y="989268"/>
+            <a:ext cx="331634" cy="331634"/>
+          </a:xfrm>
+          <a:prstGeom prst="rect">
+            <a:avLst/>
+          </a:prstGeom>
+        </p:spPr>
+      </p:pic>
+      <p:sp>
+        <p:nvSpPr>
+          <p:cNvPr id="2" name="Retângulo: Cantos Arredondados 42">
+            <a:extLst>
+              <a:ext uri="{FF2B5EF4-FFF2-40B4-BE49-F238E27FC236}">
+                <a16:creationId xmlns:a16="http://schemas.microsoft.com/office/drawing/2014/main" id="{63991A6C-31A1-40A6-38E0-38B21DBA2385}"/>
+              </a:ext>
+            </a:extLst>
+          </p:cNvPr>
+          <p:cNvSpPr/>
+          <p:nvPr/>
+        </p:nvSpPr>
+        <p:spPr>
+          <a:xfrm>
             <a:off x="-1170" y="-45343"/>
-            <a:ext cx="12213078" cy="540522"/>
+            <a:ext cx="12233684" cy="853130"/>
           </a:xfrm>
           <a:custGeom>
             <a:avLst/>
@@ -5490,6 +6570,42 @@
               <a:gd name="connsiteY7" fmla="*/ 245785 h 540522"/>
               <a:gd name="connsiteX8" fmla="*/ 1172 w 12213078"/>
               <a:gd name="connsiteY8" fmla="*/ 245786 h 540522"/>
+              <a:gd name="connsiteX0" fmla="*/ 1172 w 12198313"/>
+              <a:gd name="connsiteY0" fmla="*/ 245786 h 540522"/>
+              <a:gd name="connsiteX1" fmla="*/ 246958 w 12198313"/>
+              <a:gd name="connsiteY1" fmla="*/ 0 h 540522"/>
+              <a:gd name="connsiteX2" fmla="*/ 11947387 w 12198313"/>
+              <a:gd name="connsiteY2" fmla="*/ 0 h 540522"/>
+              <a:gd name="connsiteX3" fmla="*/ 12193173 w 12198313"/>
+              <a:gd name="connsiteY3" fmla="*/ 245786 h 540522"/>
+              <a:gd name="connsiteX4" fmla="*/ 12193172 w 12198313"/>
+              <a:gd name="connsiteY4" fmla="*/ 245786 h 540522"/>
+              <a:gd name="connsiteX5" fmla="*/ 12178366 w 12198313"/>
+              <a:gd name="connsiteY5" fmla="*/ 526990 h 540522"/>
+              <a:gd name="connsiteX6" fmla="*/ 4223 w 12198313"/>
+              <a:gd name="connsiteY6" fmla="*/ 539413 h 540522"/>
+              <a:gd name="connsiteX7" fmla="*/ 1172 w 12198313"/>
+              <a:gd name="connsiteY7" fmla="*/ 245785 h 540522"/>
+              <a:gd name="connsiteX8" fmla="*/ 1172 w 12198313"/>
+              <a:gd name="connsiteY8" fmla="*/ 245786 h 540522"/>
+              <a:gd name="connsiteX0" fmla="*/ 1172 w 12233684"/>
+              <a:gd name="connsiteY0" fmla="*/ 245786 h 551725"/>
+              <a:gd name="connsiteX1" fmla="*/ 246958 w 12233684"/>
+              <a:gd name="connsiteY1" fmla="*/ 0 h 551725"/>
+              <a:gd name="connsiteX2" fmla="*/ 11947387 w 12233684"/>
+              <a:gd name="connsiteY2" fmla="*/ 0 h 551725"/>
+              <a:gd name="connsiteX3" fmla="*/ 12193173 w 12233684"/>
+              <a:gd name="connsiteY3" fmla="*/ 245786 h 551725"/>
+              <a:gd name="connsiteX4" fmla="*/ 12193172 w 12233684"/>
+              <a:gd name="connsiteY4" fmla="*/ 245786 h 551725"/>
+              <a:gd name="connsiteX5" fmla="*/ 12224086 w 12233684"/>
+              <a:gd name="connsiteY5" fmla="*/ 551630 h 551725"/>
+              <a:gd name="connsiteX6" fmla="*/ 4223 w 12233684"/>
+              <a:gd name="connsiteY6" fmla="*/ 539413 h 551725"/>
+              <a:gd name="connsiteX7" fmla="*/ 1172 w 12233684"/>
+              <a:gd name="connsiteY7" fmla="*/ 245785 h 551725"/>
+              <a:gd name="connsiteX8" fmla="*/ 1172 w 12233684"/>
+              <a:gd name="connsiteY8" fmla="*/ 245786 h 551725"/>
             </a:gdLst>
             <a:ahLst/>
             <a:cxnLst>
@@ -5523,7 +6639,7 @@
             </a:cxnLst>
             <a:rect l="l" t="t" r="r" b="b"/>
             <a:pathLst>
-              <a:path w="12213078" h="540522">
+              <a:path w="12233684" h="551725">
                 <a:moveTo>
                   <a:pt x="1172" y="245786"/>
                 </a:moveTo>
@@ -5545,8 +6661,8 @@
                 </a:lnTo>
                 <a:cubicBezTo>
                   <a:pt x="12193172" y="381530"/>
-                  <a:pt x="12233149" y="496334"/>
-                  <a:pt x="12199798" y="491571"/>
+                  <a:pt x="12257437" y="556393"/>
+                  <a:pt x="12224086" y="551630"/>
                 </a:cubicBezTo>
                 <a:lnTo>
                   <a:pt x="4223" y="539413"/>
@@ -5596,1056 +6712,12 @@
           </a:p>
         </p:txBody>
       </p:sp>
-      <p:sp>
-        <p:nvSpPr>
-          <p:cNvPr id="6" name="Retângulo: Cantos Arredondados 5">
-            <a:extLst>
-              <a:ext uri="{FF2B5EF4-FFF2-40B4-BE49-F238E27FC236}">
-                <a16:creationId xmlns:a16="http://schemas.microsoft.com/office/drawing/2014/main" id="{FC26449B-EDB2-FD78-A80D-52380FF78B60}"/>
-              </a:ext>
-            </a:extLst>
-          </p:cNvPr>
-          <p:cNvSpPr/>
-          <p:nvPr/>
-        </p:nvSpPr>
-        <p:spPr>
-          <a:xfrm>
-            <a:off x="1023457" y="574651"/>
-            <a:ext cx="2377469" cy="1254149"/>
-          </a:xfrm>
-          <a:prstGeom prst="roundRect">
-            <a:avLst>
-              <a:gd name="adj" fmla="val 8257"/>
-            </a:avLst>
-          </a:prstGeom>
-          <a:solidFill>
-            <a:schemeClr val="bg1"/>
-          </a:solidFill>
-          <a:ln>
-            <a:noFill/>
-          </a:ln>
-          <a:effectLst>
-            <a:outerShdw blurRad="101600" dist="38100" dir="5400000" algn="t" rotWithShape="0">
-              <a:prstClr val="black">
-                <a:alpha val="20000"/>
-              </a:prstClr>
-            </a:outerShdw>
-          </a:effectLst>
-        </p:spPr>
-        <p:style>
-          <a:lnRef idx="2">
-            <a:schemeClr val="accent1">
-              <a:shade val="15000"/>
-            </a:schemeClr>
-          </a:lnRef>
-          <a:fillRef idx="1">
-            <a:schemeClr val="accent1"/>
-          </a:fillRef>
-          <a:effectRef idx="0">
-            <a:schemeClr val="accent1"/>
-          </a:effectRef>
-          <a:fontRef idx="minor">
-            <a:schemeClr val="lt1"/>
-          </a:fontRef>
-        </p:style>
-        <p:txBody>
-          <a:bodyPr rtlCol="0" anchor="ctr"/>
-          <a:lstStyle/>
-          <a:p>
-            <a:pPr algn="ctr"/>
-            <a:endParaRPr lang="pt-BR"/>
-          </a:p>
-        </p:txBody>
-      </p:sp>
-      <p:sp>
-        <p:nvSpPr>
-          <p:cNvPr id="7" name="Retângulo: Cantos Arredondados 6">
-            <a:extLst>
-              <a:ext uri="{FF2B5EF4-FFF2-40B4-BE49-F238E27FC236}">
-                <a16:creationId xmlns:a16="http://schemas.microsoft.com/office/drawing/2014/main" id="{C1D1ACFA-3461-5FAE-3782-4DD171E7EFDF}"/>
-              </a:ext>
-            </a:extLst>
-          </p:cNvPr>
-          <p:cNvSpPr/>
-          <p:nvPr/>
-        </p:nvSpPr>
-        <p:spPr>
-          <a:xfrm>
-            <a:off x="3842379" y="570816"/>
-            <a:ext cx="2377469" cy="1254149"/>
-          </a:xfrm>
-          <a:prstGeom prst="roundRect">
-            <a:avLst>
-              <a:gd name="adj" fmla="val 7416"/>
-            </a:avLst>
-          </a:prstGeom>
-          <a:solidFill>
-            <a:schemeClr val="bg1"/>
-          </a:solidFill>
-          <a:ln>
-            <a:noFill/>
-          </a:ln>
-          <a:effectLst>
-            <a:outerShdw blurRad="101600" dist="38100" dir="5400000" algn="t" rotWithShape="0">
-              <a:prstClr val="black">
-                <a:alpha val="20000"/>
-              </a:prstClr>
-            </a:outerShdw>
-          </a:effectLst>
-        </p:spPr>
-        <p:style>
-          <a:lnRef idx="2">
-            <a:schemeClr val="accent1">
-              <a:shade val="15000"/>
-            </a:schemeClr>
-          </a:lnRef>
-          <a:fillRef idx="1">
-            <a:schemeClr val="accent1"/>
-          </a:fillRef>
-          <a:effectRef idx="0">
-            <a:schemeClr val="accent1"/>
-          </a:effectRef>
-          <a:fontRef idx="minor">
-            <a:schemeClr val="lt1"/>
-          </a:fontRef>
-        </p:style>
-        <p:txBody>
-          <a:bodyPr rtlCol="0" anchor="ctr"/>
-          <a:lstStyle/>
-          <a:p>
-            <a:pPr algn="ctr"/>
-            <a:endParaRPr lang="pt-BR"/>
-          </a:p>
-        </p:txBody>
-      </p:sp>
-      <p:sp>
-        <p:nvSpPr>
-          <p:cNvPr id="8" name="Retângulo: Cantos Arredondados 7">
-            <a:extLst>
-              <a:ext uri="{FF2B5EF4-FFF2-40B4-BE49-F238E27FC236}">
-                <a16:creationId xmlns:a16="http://schemas.microsoft.com/office/drawing/2014/main" id="{65F19F60-83F0-EC32-4520-3604AE1ADE84}"/>
-              </a:ext>
-            </a:extLst>
-          </p:cNvPr>
-          <p:cNvSpPr/>
-          <p:nvPr/>
-        </p:nvSpPr>
-        <p:spPr>
-          <a:xfrm>
-            <a:off x="6661301" y="570817"/>
-            <a:ext cx="2377469" cy="1254148"/>
-          </a:xfrm>
-          <a:prstGeom prst="roundRect">
-            <a:avLst>
-              <a:gd name="adj" fmla="val 7416"/>
-            </a:avLst>
-          </a:prstGeom>
-          <a:solidFill>
-            <a:schemeClr val="bg1"/>
-          </a:solidFill>
-          <a:ln>
-            <a:noFill/>
-          </a:ln>
-          <a:effectLst>
-            <a:outerShdw blurRad="101600" dist="38100" dir="5400000" algn="t" rotWithShape="0">
-              <a:prstClr val="black">
-                <a:alpha val="20000"/>
-              </a:prstClr>
-            </a:outerShdw>
-          </a:effectLst>
-        </p:spPr>
-        <p:style>
-          <a:lnRef idx="2">
-            <a:schemeClr val="accent1">
-              <a:shade val="15000"/>
-            </a:schemeClr>
-          </a:lnRef>
-          <a:fillRef idx="1">
-            <a:schemeClr val="accent1"/>
-          </a:fillRef>
-          <a:effectRef idx="0">
-            <a:schemeClr val="accent1"/>
-          </a:effectRef>
-          <a:fontRef idx="minor">
-            <a:schemeClr val="lt1"/>
-          </a:fontRef>
-        </p:style>
-        <p:txBody>
-          <a:bodyPr rtlCol="0" anchor="ctr"/>
-          <a:lstStyle/>
-          <a:p>
-            <a:pPr algn="ctr"/>
-            <a:endParaRPr lang="pt-BR"/>
-          </a:p>
-        </p:txBody>
-      </p:sp>
-      <p:sp>
-        <p:nvSpPr>
-          <p:cNvPr id="9" name="Retângulo: Cantos Arredondados 8">
-            <a:extLst>
-              <a:ext uri="{FF2B5EF4-FFF2-40B4-BE49-F238E27FC236}">
-                <a16:creationId xmlns:a16="http://schemas.microsoft.com/office/drawing/2014/main" id="{6A632AA5-8ABB-DC7E-9099-17ABD1D11638}"/>
-              </a:ext>
-            </a:extLst>
-          </p:cNvPr>
-          <p:cNvSpPr/>
-          <p:nvPr/>
-        </p:nvSpPr>
-        <p:spPr>
-          <a:xfrm>
-            <a:off x="9480223" y="570817"/>
-            <a:ext cx="2377469" cy="1254148"/>
-          </a:xfrm>
-          <a:prstGeom prst="roundRect">
-            <a:avLst>
-              <a:gd name="adj" fmla="val 7416"/>
-            </a:avLst>
-          </a:prstGeom>
-          <a:solidFill>
-            <a:schemeClr val="bg1"/>
-          </a:solidFill>
-          <a:ln>
-            <a:noFill/>
-          </a:ln>
-          <a:effectLst>
-            <a:outerShdw blurRad="101600" dist="38100" dir="5400000" algn="t" rotWithShape="0">
-              <a:prstClr val="black">
-                <a:alpha val="20000"/>
-              </a:prstClr>
-            </a:outerShdw>
-          </a:effectLst>
-        </p:spPr>
-        <p:style>
-          <a:lnRef idx="2">
-            <a:schemeClr val="accent1">
-              <a:shade val="15000"/>
-            </a:schemeClr>
-          </a:lnRef>
-          <a:fillRef idx="1">
-            <a:schemeClr val="accent1"/>
-          </a:fillRef>
-          <a:effectRef idx="0">
-            <a:schemeClr val="accent1"/>
-          </a:effectRef>
-          <a:fontRef idx="minor">
-            <a:schemeClr val="lt1"/>
-          </a:fontRef>
-        </p:style>
-        <p:txBody>
-          <a:bodyPr rtlCol="0" anchor="ctr"/>
-          <a:lstStyle/>
-          <a:p>
-            <a:pPr algn="ctr"/>
-            <a:endParaRPr lang="pt-BR"/>
-          </a:p>
-        </p:txBody>
-      </p:sp>
-      <p:sp>
-        <p:nvSpPr>
-          <p:cNvPr id="10" name="Retângulo: Cantos Arredondados 9">
-            <a:extLst>
-              <a:ext uri="{FF2B5EF4-FFF2-40B4-BE49-F238E27FC236}">
-                <a16:creationId xmlns:a16="http://schemas.microsoft.com/office/drawing/2014/main" id="{150E8CFD-F5FC-3CEB-1CE3-7FEEBA137545}"/>
-              </a:ext>
-            </a:extLst>
-          </p:cNvPr>
-          <p:cNvSpPr/>
-          <p:nvPr/>
-        </p:nvSpPr>
-        <p:spPr>
-          <a:xfrm>
-            <a:off x="1023457" y="2166731"/>
-            <a:ext cx="8421442" cy="4501542"/>
-          </a:xfrm>
-          <a:prstGeom prst="roundRect">
-            <a:avLst>
-              <a:gd name="adj" fmla="val 5297"/>
-            </a:avLst>
-          </a:prstGeom>
-          <a:solidFill>
-            <a:schemeClr val="bg1"/>
-          </a:solidFill>
-          <a:ln>
-            <a:noFill/>
-          </a:ln>
-          <a:effectLst>
-            <a:outerShdw blurRad="101600" dist="38100" dir="5400000" algn="t" rotWithShape="0">
-              <a:prstClr val="black">
-                <a:alpha val="20000"/>
-              </a:prstClr>
-            </a:outerShdw>
-          </a:effectLst>
-        </p:spPr>
-        <p:style>
-          <a:lnRef idx="2">
-            <a:schemeClr val="accent1">
-              <a:shade val="15000"/>
-            </a:schemeClr>
-          </a:lnRef>
-          <a:fillRef idx="1">
-            <a:schemeClr val="accent1"/>
-          </a:fillRef>
-          <a:effectRef idx="0">
-            <a:schemeClr val="accent1"/>
-          </a:effectRef>
-          <a:fontRef idx="minor">
-            <a:schemeClr val="lt1"/>
-          </a:fontRef>
-        </p:style>
-        <p:txBody>
-          <a:bodyPr rtlCol="0" anchor="ctr"/>
-          <a:lstStyle/>
-          <a:p>
-            <a:pPr algn="ctr"/>
-            <a:endParaRPr lang="pt-BR"/>
-          </a:p>
-        </p:txBody>
-      </p:sp>
-      <p:sp>
-        <p:nvSpPr>
-          <p:cNvPr id="34" name="Rectangle 1">
-            <a:extLst>
-              <a:ext uri="{FF2B5EF4-FFF2-40B4-BE49-F238E27FC236}">
-                <a16:creationId xmlns:a16="http://schemas.microsoft.com/office/drawing/2014/main" id="{C7E92271-A996-51B7-F0A8-340C6196C620}"/>
-              </a:ext>
-            </a:extLst>
-          </p:cNvPr>
-          <p:cNvSpPr>
-            <a:spLocks noChangeArrowheads="1"/>
-          </p:cNvSpPr>
-          <p:nvPr/>
-        </p:nvSpPr>
-        <p:spPr bwMode="auto">
-          <a:xfrm>
-            <a:off x="0" y="0"/>
-            <a:ext cx="12192000" cy="0"/>
-          </a:xfrm>
-          <a:prstGeom prst="rect">
-            <a:avLst/>
-          </a:prstGeom>
-          <a:noFill/>
-          <a:ln>
-            <a:noFill/>
-          </a:ln>
-          <a:effectLst/>
-          <a:extLst>
-            <a:ext uri="{909E8E84-426E-40DD-AFC4-6F175D3DCCD1}">
-              <a14:hiddenFill xmlns:a14="http://schemas.microsoft.com/office/drawing/2010/main">
-                <a:solidFill>
-                  <a:schemeClr val="accent1"/>
-                </a:solidFill>
-              </a14:hiddenFill>
-            </a:ext>
-            <a:ext uri="{91240B29-F687-4F45-9708-019B960494DF}">
-              <a14:hiddenLine xmlns:a14="http://schemas.microsoft.com/office/drawing/2010/main" w="9525">
-                <a:solidFill>
-                  <a:schemeClr val="tx1"/>
-                </a:solidFill>
-                <a:miter lim="800000"/>
-                <a:headEnd/>
-                <a:tailEnd/>
-              </a14:hiddenLine>
-            </a:ext>
-            <a:ext uri="{AF507438-7753-43E0-B8FC-AC1667EBCBE1}">
-              <a14:hiddenEffects xmlns:a14="http://schemas.microsoft.com/office/drawing/2010/main">
-                <a:effectLst>
-                  <a:outerShdw dist="35921" dir="2700000" algn="ctr" rotWithShape="0">
-                    <a:schemeClr val="bg2"/>
-                  </a:outerShdw>
-                </a:effectLst>
-              </a14:hiddenEffects>
-            </a:ext>
-          </a:extLst>
-        </p:spPr>
-        <p:txBody>
-          <a:bodyPr vert="horz" wrap="none" lIns="91440" tIns="45720" rIns="91440" bIns="45720" numCol="1" anchor="ctr" anchorCtr="0" compatLnSpc="1">
-            <a:prstTxWarp prst="textNoShape">
-              <a:avLst/>
-            </a:prstTxWarp>
-            <a:spAutoFit/>
-          </a:bodyPr>
-          <a:lstStyle/>
-          <a:p>
-            <a:endParaRPr lang="pt-BR"/>
-          </a:p>
-        </p:txBody>
-      </p:sp>
       <p:pic>
         <p:nvPicPr>
-          <p:cNvPr id="40" name="Imagem 39" descr="Logotipo&#10;&#10;O conteúdo gerado por IA pode estar incorreto.">
-            <a:extLst>
-              <a:ext uri="{FF2B5EF4-FFF2-40B4-BE49-F238E27FC236}">
-                <a16:creationId xmlns:a16="http://schemas.microsoft.com/office/drawing/2014/main" id="{3DD9B057-5B8B-AEEC-0531-DFAFCD316103}"/>
-              </a:ext>
-            </a:extLst>
-          </p:cNvPr>
-          <p:cNvPicPr>
-            <a:picLocks noChangeAspect="1"/>
-          </p:cNvPicPr>
-          <p:nvPr/>
-        </p:nvPicPr>
-        <p:blipFill>
-          <a:blip r:embed="rId2">
-            <a:extLst>
-              <a:ext uri="{28A0092B-C50C-407E-A947-70E740481C1C}">
-                <a14:useLocalDpi xmlns:a14="http://schemas.microsoft.com/office/drawing/2010/main" val="0"/>
-              </a:ext>
-            </a:extLst>
-          </a:blip>
-          <a:stretch>
-            <a:fillRect/>
-          </a:stretch>
-        </p:blipFill>
-        <p:spPr>
-          <a:xfrm>
-            <a:off x="-151399" y="-496475"/>
-            <a:ext cx="1946544" cy="1496684"/>
-          </a:xfrm>
-          <a:prstGeom prst="rect">
-            <a:avLst/>
-          </a:prstGeom>
-        </p:spPr>
-      </p:pic>
-      <p:sp>
-        <p:nvSpPr>
-          <p:cNvPr id="56" name="Retângulo: Cantos Arredondados 55">
-            <a:extLst>
-              <a:ext uri="{FF2B5EF4-FFF2-40B4-BE49-F238E27FC236}">
-                <a16:creationId xmlns:a16="http://schemas.microsoft.com/office/drawing/2014/main" id="{D4F2FB47-E006-A114-B89C-26A04457A230}"/>
-              </a:ext>
-            </a:extLst>
-          </p:cNvPr>
-          <p:cNvSpPr/>
-          <p:nvPr/>
-        </p:nvSpPr>
-        <p:spPr>
-          <a:xfrm>
-            <a:off x="2872933" y="613132"/>
-            <a:ext cx="433589" cy="466012"/>
-          </a:xfrm>
-          <a:prstGeom prst="roundRect">
-            <a:avLst>
-              <a:gd name="adj" fmla="val 35127"/>
-            </a:avLst>
-          </a:prstGeom>
-          <a:solidFill>
-            <a:srgbClr val="2F3A5F">
-              <a:alpha val="18000"/>
-            </a:srgbClr>
-          </a:solidFill>
-          <a:ln>
-            <a:noFill/>
-          </a:ln>
-        </p:spPr>
-        <p:style>
-          <a:lnRef idx="2">
-            <a:schemeClr val="accent1">
-              <a:shade val="15000"/>
-            </a:schemeClr>
-          </a:lnRef>
-          <a:fillRef idx="1">
-            <a:schemeClr val="accent1"/>
-          </a:fillRef>
-          <a:effectRef idx="0">
-            <a:schemeClr val="accent1"/>
-          </a:effectRef>
-          <a:fontRef idx="minor">
-            <a:schemeClr val="lt1"/>
-          </a:fontRef>
-        </p:style>
-        <p:txBody>
-          <a:bodyPr rtlCol="0" anchor="ctr"/>
-          <a:lstStyle/>
-          <a:p>
-            <a:pPr algn="ctr"/>
-            <a:endParaRPr lang="pt-BR" dirty="0"/>
-          </a:p>
-        </p:txBody>
-      </p:sp>
-      <p:sp>
-        <p:nvSpPr>
-          <p:cNvPr id="57" name="Retângulo: Cantos Arredondados 56">
-            <a:extLst>
-              <a:ext uri="{FF2B5EF4-FFF2-40B4-BE49-F238E27FC236}">
-                <a16:creationId xmlns:a16="http://schemas.microsoft.com/office/drawing/2014/main" id="{D9909437-8353-1D03-C311-8E09F289071E}"/>
-              </a:ext>
-            </a:extLst>
-          </p:cNvPr>
-          <p:cNvSpPr/>
-          <p:nvPr/>
-        </p:nvSpPr>
-        <p:spPr>
-          <a:xfrm>
-            <a:off x="5681557" y="606172"/>
-            <a:ext cx="450374" cy="466489"/>
-          </a:xfrm>
-          <a:prstGeom prst="roundRect">
-            <a:avLst>
-              <a:gd name="adj" fmla="val 35127"/>
-            </a:avLst>
-          </a:prstGeom>
-          <a:solidFill>
-            <a:srgbClr val="2F3A5F">
-              <a:alpha val="17647"/>
-            </a:srgbClr>
-          </a:solidFill>
-          <a:ln>
-            <a:noFill/>
-          </a:ln>
-        </p:spPr>
-        <p:style>
-          <a:lnRef idx="2">
-            <a:schemeClr val="accent1">
-              <a:shade val="15000"/>
-            </a:schemeClr>
-          </a:lnRef>
-          <a:fillRef idx="1">
-            <a:schemeClr val="accent1"/>
-          </a:fillRef>
-          <a:effectRef idx="0">
-            <a:schemeClr val="accent1"/>
-          </a:effectRef>
-          <a:fontRef idx="minor">
-            <a:schemeClr val="lt1"/>
-          </a:fontRef>
-        </p:style>
-        <p:txBody>
-          <a:bodyPr rtlCol="0" anchor="ctr"/>
-          <a:lstStyle/>
-          <a:p>
-            <a:pPr algn="ctr"/>
-            <a:endParaRPr lang="pt-BR"/>
-          </a:p>
-        </p:txBody>
-      </p:sp>
-      <p:sp>
-        <p:nvSpPr>
-          <p:cNvPr id="58" name="Retângulo: Cantos Arredondados 57">
-            <a:extLst>
-              <a:ext uri="{FF2B5EF4-FFF2-40B4-BE49-F238E27FC236}">
-                <a16:creationId xmlns:a16="http://schemas.microsoft.com/office/drawing/2014/main" id="{849E17AF-F204-D19B-83B7-493ED982D77C}"/>
-              </a:ext>
-            </a:extLst>
-          </p:cNvPr>
-          <p:cNvSpPr/>
-          <p:nvPr/>
-        </p:nvSpPr>
-        <p:spPr>
-          <a:xfrm>
-            <a:off x="8492961" y="606172"/>
-            <a:ext cx="450374" cy="466489"/>
-          </a:xfrm>
-          <a:prstGeom prst="roundRect">
-            <a:avLst>
-              <a:gd name="adj" fmla="val 35127"/>
-            </a:avLst>
-          </a:prstGeom>
-          <a:solidFill>
-            <a:srgbClr val="2F3A5F">
-              <a:alpha val="18000"/>
-            </a:srgbClr>
-          </a:solidFill>
-          <a:ln>
-            <a:noFill/>
-          </a:ln>
-        </p:spPr>
-        <p:style>
-          <a:lnRef idx="2">
-            <a:schemeClr val="accent1">
-              <a:shade val="15000"/>
-            </a:schemeClr>
-          </a:lnRef>
-          <a:fillRef idx="1">
-            <a:schemeClr val="accent1"/>
-          </a:fillRef>
-          <a:effectRef idx="0">
-            <a:schemeClr val="accent1"/>
-          </a:effectRef>
-          <a:fontRef idx="minor">
-            <a:schemeClr val="lt1"/>
-          </a:fontRef>
-        </p:style>
-        <p:txBody>
-          <a:bodyPr rtlCol="0" anchor="ctr"/>
-          <a:lstStyle/>
-          <a:p>
-            <a:pPr algn="ctr"/>
-            <a:endParaRPr lang="pt-BR"/>
-          </a:p>
-        </p:txBody>
-      </p:sp>
-      <p:sp>
-        <p:nvSpPr>
-          <p:cNvPr id="59" name="Retângulo: Cantos Arredondados 58">
-            <a:extLst>
-              <a:ext uri="{FF2B5EF4-FFF2-40B4-BE49-F238E27FC236}">
-                <a16:creationId xmlns:a16="http://schemas.microsoft.com/office/drawing/2014/main" id="{52FF75AF-44A2-0E85-0E41-7AB475B2B28B}"/>
-              </a:ext>
-            </a:extLst>
-          </p:cNvPr>
-          <p:cNvSpPr/>
-          <p:nvPr/>
-        </p:nvSpPr>
-        <p:spPr>
-          <a:xfrm>
-            <a:off x="11329317" y="606172"/>
-            <a:ext cx="450374" cy="466489"/>
-          </a:xfrm>
-          <a:prstGeom prst="roundRect">
-            <a:avLst>
-              <a:gd name="adj" fmla="val 35127"/>
-            </a:avLst>
-          </a:prstGeom>
-          <a:solidFill>
-            <a:srgbClr val="2F3A5F">
-              <a:alpha val="18000"/>
-            </a:srgbClr>
-          </a:solidFill>
-          <a:ln>
-            <a:noFill/>
-          </a:ln>
-        </p:spPr>
-        <p:style>
-          <a:lnRef idx="2">
-            <a:schemeClr val="accent1">
-              <a:shade val="15000"/>
-            </a:schemeClr>
-          </a:lnRef>
-          <a:fillRef idx="1">
-            <a:schemeClr val="accent1"/>
-          </a:fillRef>
-          <a:effectRef idx="0">
-            <a:schemeClr val="accent1"/>
-          </a:effectRef>
-          <a:fontRef idx="minor">
-            <a:schemeClr val="lt1"/>
-          </a:fontRef>
-        </p:style>
-        <p:txBody>
-          <a:bodyPr rtlCol="0" anchor="ctr"/>
-          <a:lstStyle/>
-          <a:p>
-            <a:pPr algn="ctr"/>
-            <a:endParaRPr lang="pt-BR"/>
-          </a:p>
-        </p:txBody>
-      </p:sp>
-      <p:pic>
-        <p:nvPicPr>
-          <p:cNvPr id="16" name="Imagem 15" descr="Logotipo, Ícone&#10;&#10;O conteúdo gerado por IA pode estar incorreto.">
-            <a:extLst>
-              <a:ext uri="{FF2B5EF4-FFF2-40B4-BE49-F238E27FC236}">
-                <a16:creationId xmlns:a16="http://schemas.microsoft.com/office/drawing/2014/main" id="{72750EFD-5EB9-84F7-327A-F804A22CDF68}"/>
-              </a:ext>
-            </a:extLst>
-          </p:cNvPr>
-          <p:cNvPicPr>
-            <a:picLocks noChangeAspect="1"/>
-          </p:cNvPicPr>
-          <p:nvPr/>
-        </p:nvPicPr>
-        <p:blipFill>
-          <a:blip r:embed="rId3">
-            <a:extLst>
-              <a:ext uri="{28A0092B-C50C-407E-A947-70E740481C1C}">
-                <a14:useLocalDpi xmlns:a14="http://schemas.microsoft.com/office/drawing/2010/main" val="0"/>
-              </a:ext>
-            </a:extLst>
-          </a:blip>
-          <a:stretch>
-            <a:fillRect/>
-          </a:stretch>
-        </p:blipFill>
-        <p:spPr>
-          <a:xfrm>
-            <a:off x="88189" y="3465029"/>
-            <a:ext cx="483326" cy="483326"/>
-          </a:xfrm>
-          <a:prstGeom prst="rect">
-            <a:avLst/>
-          </a:prstGeom>
-        </p:spPr>
-      </p:pic>
-      <p:pic>
-        <p:nvPicPr>
-          <p:cNvPr id="22" name="Imagem 21" descr="Ícone&#10;&#10;O conteúdo gerado por IA pode estar incorreto.">
-            <a:extLst>
-              <a:ext uri="{FF2B5EF4-FFF2-40B4-BE49-F238E27FC236}">
-                <a16:creationId xmlns:a16="http://schemas.microsoft.com/office/drawing/2014/main" id="{80050991-3381-8A02-8110-9D095FC4F3C1}"/>
-              </a:ext>
-            </a:extLst>
-          </p:cNvPr>
-          <p:cNvPicPr>
-            <a:picLocks noChangeAspect="1"/>
-          </p:cNvPicPr>
-          <p:nvPr/>
-        </p:nvPicPr>
-        <p:blipFill>
-          <a:blip r:embed="rId4">
-            <a:extLst>
-              <a:ext uri="{28A0092B-C50C-407E-A947-70E740481C1C}">
-                <a14:useLocalDpi xmlns:a14="http://schemas.microsoft.com/office/drawing/2010/main" val="0"/>
-              </a:ext>
-            </a:extLst>
-          </a:blip>
-          <a:stretch>
-            <a:fillRect/>
-          </a:stretch>
-        </p:blipFill>
-        <p:spPr>
-          <a:xfrm>
-            <a:off x="88189" y="4211512"/>
-            <a:ext cx="456652" cy="456652"/>
-          </a:xfrm>
-          <a:prstGeom prst="rect">
-            <a:avLst/>
-          </a:prstGeom>
-        </p:spPr>
-      </p:pic>
-      <p:pic>
-        <p:nvPicPr>
-          <p:cNvPr id="25" name="Imagem 24" descr="Uma imagem contendo Ícone&#10;&#10;O conteúdo gerado por IA pode estar incorreto.">
-            <a:extLst>
-              <a:ext uri="{FF2B5EF4-FFF2-40B4-BE49-F238E27FC236}">
-                <a16:creationId xmlns:a16="http://schemas.microsoft.com/office/drawing/2014/main" id="{09D0A347-19B1-96AE-D96A-6F3E5EBE9360}"/>
-              </a:ext>
-            </a:extLst>
-          </p:cNvPr>
-          <p:cNvPicPr>
-            <a:picLocks noChangeAspect="1"/>
-          </p:cNvPicPr>
-          <p:nvPr/>
-        </p:nvPicPr>
-        <p:blipFill>
-          <a:blip r:embed="rId5">
-            <a:extLst>
-              <a:ext uri="{28A0092B-C50C-407E-A947-70E740481C1C}">
-                <a14:useLocalDpi xmlns:a14="http://schemas.microsoft.com/office/drawing/2010/main" val="0"/>
-              </a:ext>
-            </a:extLst>
-          </a:blip>
-          <a:stretch>
-            <a:fillRect/>
-          </a:stretch>
-        </p:blipFill>
-        <p:spPr>
-          <a:xfrm flipH="1">
-            <a:off x="138151" y="1295499"/>
-            <a:ext cx="349421" cy="349421"/>
-          </a:xfrm>
-          <a:prstGeom prst="rect">
-            <a:avLst/>
-          </a:prstGeom>
-        </p:spPr>
-      </p:pic>
-      <p:pic>
-        <p:nvPicPr>
-          <p:cNvPr id="3" name="Imagem 2" descr="Ícone&#10;&#10;O conteúdo gerado por IA pode estar incorreto.">
-            <a:extLst>
-              <a:ext uri="{FF2B5EF4-FFF2-40B4-BE49-F238E27FC236}">
-                <a16:creationId xmlns:a16="http://schemas.microsoft.com/office/drawing/2014/main" id="{5DDFF6DC-D44A-A46D-56F0-9D3568F865B5}"/>
-              </a:ext>
-            </a:extLst>
-          </p:cNvPr>
-          <p:cNvPicPr>
-            <a:picLocks noChangeAspect="1"/>
-          </p:cNvPicPr>
-          <p:nvPr/>
-        </p:nvPicPr>
-        <p:blipFill>
-          <a:blip r:embed="rId6">
-            <a:extLst>
-              <a:ext uri="{28A0092B-C50C-407E-A947-70E740481C1C}">
-                <a14:useLocalDpi xmlns:a14="http://schemas.microsoft.com/office/drawing/2010/main" val="0"/>
-              </a:ext>
-            </a:extLst>
-          </a:blip>
-          <a:stretch>
-            <a:fillRect/>
-          </a:stretch>
-        </p:blipFill>
-        <p:spPr>
-          <a:xfrm>
-            <a:off x="89890" y="1911041"/>
-            <a:ext cx="450321" cy="450321"/>
-          </a:xfrm>
-          <a:prstGeom prst="rect">
-            <a:avLst/>
-          </a:prstGeom>
-        </p:spPr>
-      </p:pic>
-      <p:pic>
-        <p:nvPicPr>
-          <p:cNvPr id="15" name="Imagem 14" descr="Ícone&#10;&#10;O conteúdo gerado por IA pode estar incorreto.">
-            <a:extLst>
-              <a:ext uri="{FF2B5EF4-FFF2-40B4-BE49-F238E27FC236}">
-                <a16:creationId xmlns:a16="http://schemas.microsoft.com/office/drawing/2014/main" id="{6DD0D9C7-92A9-3243-FC0E-365F9ACCC73C}"/>
-              </a:ext>
-            </a:extLst>
-          </p:cNvPr>
-          <p:cNvPicPr>
-            <a:picLocks noChangeAspect="1"/>
-          </p:cNvPicPr>
-          <p:nvPr/>
-        </p:nvPicPr>
-        <p:blipFill>
-          <a:blip r:embed="rId7">
-            <a:extLst>
-              <a:ext uri="{28A0092B-C50C-407E-A947-70E740481C1C}">
-                <a14:useLocalDpi xmlns:a14="http://schemas.microsoft.com/office/drawing/2010/main" val="0"/>
-              </a:ext>
-            </a:extLst>
-          </a:blip>
-          <a:stretch>
-            <a:fillRect/>
-          </a:stretch>
-        </p:blipFill>
-        <p:spPr>
-          <a:xfrm>
-            <a:off x="144153" y="2743126"/>
-            <a:ext cx="355674" cy="355674"/>
-          </a:xfrm>
-          <a:prstGeom prst="rect">
-            <a:avLst/>
-          </a:prstGeom>
-        </p:spPr>
-      </p:pic>
-      <p:sp>
-        <p:nvSpPr>
-          <p:cNvPr id="17" name="Retângulo: Cantos Arredondados 16">
-            <a:extLst>
-              <a:ext uri="{FF2B5EF4-FFF2-40B4-BE49-F238E27FC236}">
-                <a16:creationId xmlns:a16="http://schemas.microsoft.com/office/drawing/2014/main" id="{7B48C9E3-6494-5DBF-B726-271748E11AEE}"/>
-              </a:ext>
-            </a:extLst>
-          </p:cNvPr>
-          <p:cNvSpPr/>
-          <p:nvPr/>
-        </p:nvSpPr>
-        <p:spPr>
-          <a:xfrm>
-            <a:off x="9710530" y="2174508"/>
-            <a:ext cx="2347367" cy="2282750"/>
-          </a:xfrm>
-          <a:prstGeom prst="roundRect">
-            <a:avLst>
-              <a:gd name="adj" fmla="val 7416"/>
-            </a:avLst>
-          </a:prstGeom>
-          <a:solidFill>
-            <a:schemeClr val="bg1"/>
-          </a:solidFill>
-          <a:ln>
-            <a:noFill/>
-          </a:ln>
-          <a:effectLst>
-            <a:outerShdw blurRad="101600" dist="38100" dir="5400000" algn="t" rotWithShape="0">
-              <a:prstClr val="black">
-                <a:alpha val="20000"/>
-              </a:prstClr>
-            </a:outerShdw>
-          </a:effectLst>
-        </p:spPr>
-        <p:style>
-          <a:lnRef idx="2">
-            <a:schemeClr val="accent1">
-              <a:shade val="15000"/>
-            </a:schemeClr>
-          </a:lnRef>
-          <a:fillRef idx="1">
-            <a:schemeClr val="accent1"/>
-          </a:fillRef>
-          <a:effectRef idx="0">
-            <a:schemeClr val="accent1"/>
-          </a:effectRef>
-          <a:fontRef idx="minor">
-            <a:schemeClr val="lt1"/>
-          </a:fontRef>
-        </p:style>
-        <p:txBody>
-          <a:bodyPr rtlCol="0" anchor="ctr"/>
-          <a:lstStyle/>
-          <a:p>
-            <a:pPr algn="ctr"/>
-            <a:endParaRPr lang="pt-BR"/>
-          </a:p>
-        </p:txBody>
-      </p:sp>
-      <p:sp>
-        <p:nvSpPr>
-          <p:cNvPr id="18" name="Retângulo: Cantos Arredondados 17">
-            <a:extLst>
-              <a:ext uri="{FF2B5EF4-FFF2-40B4-BE49-F238E27FC236}">
-                <a16:creationId xmlns:a16="http://schemas.microsoft.com/office/drawing/2014/main" id="{1320CE6E-A79C-944E-0F18-343E50B290DF}"/>
-              </a:ext>
-            </a:extLst>
-          </p:cNvPr>
-          <p:cNvSpPr/>
-          <p:nvPr/>
-        </p:nvSpPr>
-        <p:spPr>
-          <a:xfrm>
-            <a:off x="9710530" y="4668164"/>
-            <a:ext cx="2337317" cy="2000109"/>
-          </a:xfrm>
-          <a:prstGeom prst="roundRect">
-            <a:avLst>
-              <a:gd name="adj" fmla="val 7416"/>
-            </a:avLst>
-          </a:prstGeom>
-          <a:solidFill>
-            <a:schemeClr val="bg1"/>
-          </a:solidFill>
-          <a:ln>
-            <a:noFill/>
-          </a:ln>
-          <a:effectLst>
-            <a:outerShdw blurRad="101600" dist="38100" dir="5400000" algn="t" rotWithShape="0">
-              <a:prstClr val="black">
-                <a:alpha val="20000"/>
-              </a:prstClr>
-            </a:outerShdw>
-          </a:effectLst>
-        </p:spPr>
-        <p:style>
-          <a:lnRef idx="2">
-            <a:schemeClr val="accent1">
-              <a:shade val="15000"/>
-            </a:schemeClr>
-          </a:lnRef>
-          <a:fillRef idx="1">
-            <a:schemeClr val="accent1"/>
-          </a:fillRef>
-          <a:effectRef idx="0">
-            <a:schemeClr val="accent1"/>
-          </a:effectRef>
-          <a:fontRef idx="minor">
-            <a:schemeClr val="lt1"/>
-          </a:fontRef>
-        </p:style>
-        <p:txBody>
-          <a:bodyPr rtlCol="0" anchor="ctr"/>
-          <a:lstStyle/>
-          <a:p>
-            <a:pPr algn="ctr"/>
-            <a:endParaRPr lang="pt-BR"/>
-          </a:p>
-        </p:txBody>
-      </p:sp>
-      <p:pic>
-        <p:nvPicPr>
-          <p:cNvPr id="21" name="Imagem 20" descr="Ícone&#10;&#10;O conteúdo gerado por IA pode estar incorreto.">
-            <a:extLst>
-              <a:ext uri="{FF2B5EF4-FFF2-40B4-BE49-F238E27FC236}">
-                <a16:creationId xmlns:a16="http://schemas.microsoft.com/office/drawing/2014/main" id="{EC12CAE6-C32E-A834-C9AC-32A219FA521D}"/>
-              </a:ext>
-            </a:extLst>
-          </p:cNvPr>
-          <p:cNvPicPr>
-            <a:picLocks noChangeAspect="1"/>
-          </p:cNvPicPr>
-          <p:nvPr/>
-        </p:nvPicPr>
-        <p:blipFill>
-          <a:blip r:embed="rId8">
-            <a:extLst>
-              <a:ext uri="{28A0092B-C50C-407E-A947-70E740481C1C}">
-                <a14:useLocalDpi xmlns:a14="http://schemas.microsoft.com/office/drawing/2010/main" val="0"/>
-              </a:ext>
-            </a:extLst>
-          </a:blip>
-          <a:stretch>
-            <a:fillRect/>
-          </a:stretch>
-        </p:blipFill>
-        <p:spPr>
-          <a:xfrm>
-            <a:off x="2910020" y="679809"/>
-            <a:ext cx="332657" cy="332657"/>
-          </a:xfrm>
-          <a:prstGeom prst="rect">
-            <a:avLst/>
-          </a:prstGeom>
-        </p:spPr>
-      </p:pic>
-      <p:pic>
-        <p:nvPicPr>
-          <p:cNvPr id="24" name="Imagem 23" descr="Ícone&#10;&#10;O conteúdo gerado por IA pode estar incorreto.">
-            <a:extLst>
-              <a:ext uri="{FF2B5EF4-FFF2-40B4-BE49-F238E27FC236}">
-                <a16:creationId xmlns:a16="http://schemas.microsoft.com/office/drawing/2014/main" id="{0EC35161-6032-EBC3-1CDC-7F1E5AF964A5}"/>
-              </a:ext>
-            </a:extLst>
-          </p:cNvPr>
-          <p:cNvPicPr>
-            <a:picLocks noChangeAspect="1"/>
-          </p:cNvPicPr>
-          <p:nvPr/>
-        </p:nvPicPr>
-        <p:blipFill>
-          <a:blip r:embed="rId9">
-            <a:extLst>
-              <a:ext uri="{28A0092B-C50C-407E-A947-70E740481C1C}">
-                <a14:useLocalDpi xmlns:a14="http://schemas.microsoft.com/office/drawing/2010/main" val="0"/>
-              </a:ext>
-            </a:extLst>
-          </a:blip>
-          <a:stretch>
-            <a:fillRect/>
-          </a:stretch>
-        </p:blipFill>
-        <p:spPr>
-          <a:xfrm>
-            <a:off x="8552239" y="655550"/>
-            <a:ext cx="331817" cy="331817"/>
-          </a:xfrm>
-          <a:prstGeom prst="rect">
-            <a:avLst/>
-          </a:prstGeom>
-        </p:spPr>
-      </p:pic>
-      <p:pic>
-        <p:nvPicPr>
-          <p:cNvPr id="29" name="Imagem 28" descr="Ícone&#10;&#10;O conteúdo gerado por IA pode estar incorreto.">
-            <a:extLst>
-              <a:ext uri="{FF2B5EF4-FFF2-40B4-BE49-F238E27FC236}">
-                <a16:creationId xmlns:a16="http://schemas.microsoft.com/office/drawing/2014/main" id="{6EF39C74-10D2-438D-6758-7FC5583D575B}"/>
-              </a:ext>
-            </a:extLst>
-          </p:cNvPr>
-          <p:cNvPicPr>
-            <a:picLocks noChangeAspect="1"/>
-          </p:cNvPicPr>
-          <p:nvPr/>
-        </p:nvPicPr>
-        <p:blipFill>
-          <a:blip r:embed="rId10">
-            <a:extLst>
-              <a:ext uri="{28A0092B-C50C-407E-A947-70E740481C1C}">
-                <a14:useLocalDpi xmlns:a14="http://schemas.microsoft.com/office/drawing/2010/main" val="0"/>
-              </a:ext>
-            </a:extLst>
-          </a:blip>
-          <a:stretch>
-            <a:fillRect/>
-          </a:stretch>
-        </p:blipFill>
-        <p:spPr>
-          <a:xfrm>
-            <a:off x="11383752" y="650587"/>
-            <a:ext cx="341503" cy="341503"/>
-          </a:xfrm>
-          <a:prstGeom prst="rect">
-            <a:avLst/>
-          </a:prstGeom>
-        </p:spPr>
-      </p:pic>
-      <p:pic>
-        <p:nvPicPr>
-          <p:cNvPr id="31" name="Imagem 30" descr="Ícone&#10;&#10;O conteúdo gerado por IA pode estar incorreto.">
-            <a:extLst>
-              <a:ext uri="{FF2B5EF4-FFF2-40B4-BE49-F238E27FC236}">
-                <a16:creationId xmlns:a16="http://schemas.microsoft.com/office/drawing/2014/main" id="{D8DFE3BC-925E-2547-8113-3CEB4424401D}"/>
+          <p:cNvPr id="4" name="Imagem 3" descr="Logotipo&#10;&#10;O conteúdo gerado por IA pode estar incorreto.">
+            <a:extLst>
+              <a:ext uri="{FF2B5EF4-FFF2-40B4-BE49-F238E27FC236}">
+                <a16:creationId xmlns:a16="http://schemas.microsoft.com/office/drawing/2014/main" id="{F7C61615-0B47-2FC3-31FA-B5E03D16DB91}"/>
               </a:ext>
             </a:extLst>
           </p:cNvPr>
@@ -6668,8 +6740,8 @@
         </p:blipFill>
         <p:spPr>
           <a:xfrm>
-            <a:off x="5735340" y="665418"/>
-            <a:ext cx="331634" cy="331634"/>
+            <a:off x="-151400" y="-496476"/>
+            <a:ext cx="2342499" cy="1801131"/>
           </a:xfrm>
           <a:prstGeom prst="rect">
             <a:avLst/>
@@ -6678,10 +6750,10 @@
       </p:pic>
       <p:sp>
         <p:nvSpPr>
-          <p:cNvPr id="32" name="Retângulo: Cantos Arredondados 31">
-            <a:extLst>
-              <a:ext uri="{FF2B5EF4-FFF2-40B4-BE49-F238E27FC236}">
-                <a16:creationId xmlns:a16="http://schemas.microsoft.com/office/drawing/2014/main" id="{2C9A988D-D6ED-7BE9-2DE2-2FF0E649A084}"/>
+          <p:cNvPr id="11" name="Retângulo: Cantos Arredondados 10">
+            <a:extLst>
+              <a:ext uri="{FF2B5EF4-FFF2-40B4-BE49-F238E27FC236}">
+                <a16:creationId xmlns:a16="http://schemas.microsoft.com/office/drawing/2014/main" id="{F288548A-4110-00B2-C001-C805A80B227E}"/>
               </a:ext>
             </a:extLst>
           </p:cNvPr>
@@ -6690,7 +6762,7 @@
         </p:nvSpPr>
         <p:spPr>
           <a:xfrm>
-            <a:off x="1393089" y="68136"/>
+            <a:off x="1699976" y="227802"/>
             <a:ext cx="2532868" cy="309954"/>
           </a:xfrm>
           <a:prstGeom prst="roundRect">

</xml_diff>